<commit_message>
feat: lesson 4 examples, exercies and slide
</commit_message>
<xml_diff>
--- a/slides/02-js-basics.pptx
+++ b/slides/02-js-basics.pptx
@@ -252,7 +252,7 @@
           <a:p>
             <a:fld id="{126DA449-81D0-4C65-80FA-E84926361CC3}" type="datetimeFigureOut">
               <a:rPr lang="en-US" smtClean="0"/>
-              <a:t>2/29/2024</a:t>
+              <a:t>3/11/2024</a:t>
             </a:fld>
             <a:endParaRPr lang="en-US"/>
           </a:p>
@@ -22974,10 +22974,10 @@
           <a:lstStyle/>
           <a:p>
             <a:r>
-              <a:rPr lang="hu-HU"/>
-              <a:t>Jozsef Gal</a:t>
-            </a:r>
-            <a:endParaRPr lang="en-US"/>
+              <a:rPr lang="en-US"/>
+              <a:t>Janos Stefan</a:t>
+            </a:r>
+            <a:endParaRPr lang="en-US" dirty="0"/>
           </a:p>
         </p:txBody>
       </p:sp>
@@ -37596,15 +37596,6 @@
 </file>
 
 <file path=customXml/item1.xml><?xml version="1.0" encoding="utf-8"?>
-<?mso-contentType ?>
-<FormTemplates xmlns="http://schemas.microsoft.com/sharepoint/v3/contenttype/forms">
-  <Display>DocumentLibraryForm</Display>
-  <Edit>DocumentLibraryForm</Edit>
-  <New>DocumentLibraryForm</New>
-</FormTemplates>
-</file>
-
-<file path=customXml/item2.xml><?xml version="1.0" encoding="utf-8"?>
 <ct:contentTypeSchema xmlns:ct="http://schemas.microsoft.com/office/2006/metadata/contentType" xmlns:ma="http://schemas.microsoft.com/office/2006/metadata/properties/metaAttributes" ct:_="" ma:_="" ma:contentTypeName="Document" ma:contentTypeID="0x010100BA117DE914E1FC49A35D90CD8516D943" ma:contentTypeVersion="12" ma:contentTypeDescription="Create a new document." ma:contentTypeScope="" ma:versionID="e1f7c3316c007ddcbbfc786aee0f30b6">
   <xsd:schema xmlns:xsd="http://www.w3.org/2001/XMLSchema" xmlns:xs="http://www.w3.org/2001/XMLSchema" xmlns:p="http://schemas.microsoft.com/office/2006/metadata/properties" xmlns:ns2="58f349b0-675b-4c01-8ee6-14db8fa12501" xmlns:ns3="df44d29e-ce0d-48fd-88bf-98e6a958fd4b" targetNamespace="http://schemas.microsoft.com/office/2006/metadata/properties" ma:root="true" ma:fieldsID="ebdd3e3611f83f5edb1b485483198b2e" ns2:_="" ns3:_="">
     <xsd:import namespace="58f349b0-675b-4c01-8ee6-14db8fa12501"/>
@@ -37821,6 +37812,15 @@
 </ct:contentTypeSchema>
 </file>
 
+<file path=customXml/item2.xml><?xml version="1.0" encoding="utf-8"?>
+<?mso-contentType ?>
+<FormTemplates xmlns="http://schemas.microsoft.com/sharepoint/v3/contenttype/forms">
+  <Display>DocumentLibraryForm</Display>
+  <Edit>DocumentLibraryForm</Edit>
+  <New>DocumentLibraryForm</New>
+</FormTemplates>
+</file>
+
 <file path=customXml/item3.xml><?xml version="1.0" encoding="utf-8"?>
 <p:properties xmlns:p="http://schemas.microsoft.com/office/2006/metadata/properties" xmlns:xsi="http://www.w3.org/2001/XMLSchema-instance" xmlns:pc="http://schemas.microsoft.com/office/infopath/2007/PartnerControls">
   <documentManagement/>
@@ -37828,14 +37828,6 @@
 </file>
 
 <file path=customXml/itemProps1.xml><?xml version="1.0" encoding="utf-8"?>
-<ds:datastoreItem xmlns:ds="http://schemas.openxmlformats.org/officeDocument/2006/customXml" ds:itemID="{87CA341C-74C1-4577-8C96-EF2605DC526A}">
-  <ds:schemaRefs>
-    <ds:schemaRef ds:uri="http://schemas.microsoft.com/sharepoint/v3/contenttype/forms"/>
-  </ds:schemaRefs>
-</ds:datastoreItem>
-</file>
-
-<file path=customXml/itemProps2.xml><?xml version="1.0" encoding="utf-8"?>
 <ds:datastoreItem xmlns:ds="http://schemas.openxmlformats.org/officeDocument/2006/customXml" ds:itemID="{545DB04F-7584-4690-B257-DA90A69356DD}">
   <ds:schemaRefs>
     <ds:schemaRef ds:uri="58f349b0-675b-4c01-8ee6-14db8fa12501"/>
@@ -37850,6 +37842,14 @@
     <ds:schemaRef ds:uri="http://schemas.microsoft.com/office/infopath/2007/PartnerControls"/>
     <ds:schemaRef ds:uri="http://schemas.openxmlformats.org/package/2006/metadata/core-properties"/>
     <ds:schemaRef ds:uri="http://www.w3.org/2001/XMLSchema"/>
+  </ds:schemaRefs>
+</ds:datastoreItem>
+</file>
+
+<file path=customXml/itemProps2.xml><?xml version="1.0" encoding="utf-8"?>
+<ds:datastoreItem xmlns:ds="http://schemas.openxmlformats.org/officeDocument/2006/customXml" ds:itemID="{87CA341C-74C1-4577-8C96-EF2605DC526A}">
+  <ds:schemaRefs>
+    <ds:schemaRef ds:uri="http://schemas.microsoft.com/sharepoint/v3/contenttype/forms"/>
   </ds:schemaRefs>
 </ds:datastoreItem>
 </file>

</xml_diff>